<commit_message>
adding warning to slides
</commit_message>
<xml_diff>
--- a/ClassMaterials/IntroToGraphics/Slides/Graphics.pptx
+++ b/ClassMaterials/IntroToGraphics/Slides/Graphics.pptx
@@ -4830,7 +4830,7 @@
               <a:pPr>
                 <a:defRPr/>
               </a:pPr>
-              <a:t>Thursday, September 13, 2018</a:t>
+              <a:t>Wednesday, March 11, 2020</a:t>
             </a:fld>
             <a:endParaRPr lang="en-US" dirty="0"/>
           </a:p>
@@ -13181,6 +13181,14 @@
   <p:clrMapOvr>
     <a:masterClrMapping/>
   </p:clrMapOvr>
+  <mc:AlternateContent xmlns:mc="http://schemas.openxmlformats.org/markup-compatibility/2006">
+    <mc:Choice xmlns:p14="http://schemas.microsoft.com/office/powerpoint/2010/main" Requires="p14">
+      <p:transition spd="slow" p14:dur="2000"/>
+    </mc:Choice>
+    <mc:Fallback>
+      <p:transition spd="slow"/>
+    </mc:Fallback>
+  </mc:AlternateContent>
 </p:sld>
 </file>
 
@@ -13310,6 +13318,74 @@
               </a:uFill>
               <a:latin typeface="Calibri"/>
             </a:endParaRPr>
+          </a:p>
+        </p:txBody>
+      </p:sp>
+      <p:sp>
+        <p:nvSpPr>
+          <p:cNvPr id="3" name="TextBox 2"/>
+          <p:cNvSpPr txBox="1"/>
+          <p:nvPr/>
+        </p:nvSpPr>
+        <p:spPr>
+          <a:xfrm>
+            <a:off x="722160" y="927100"/>
+            <a:ext cx="7024840" cy="2554545"/>
+          </a:xfrm>
+          <a:prstGeom prst="rect">
+            <a:avLst/>
+          </a:prstGeom>
+          <a:noFill/>
+        </p:spPr>
+        <p:txBody>
+          <a:bodyPr wrap="square" rtlCol="0">
+            <a:spAutoFit/>
+          </a:bodyPr>
+          <a:lstStyle/>
+          <a:p>
+            <a:pPr algn="ctr"/>
+            <a:r>
+              <a:rPr lang="en-US" sz="3200" b="1" i="1" dirty="0" smtClean="0">
+                <a:solidFill>
+                  <a:srgbClr val="FF0000"/>
+                </a:solidFill>
+              </a:rPr>
+              <a:t>Warning: </a:t>
+            </a:r>
+            <a:r>
+              <a:rPr lang="en-US" sz="3200" i="1" dirty="0" smtClean="0"/>
+              <a:t>JavaFX </a:t>
+            </a:r>
+            <a:r>
+              <a:rPr lang="en-US" sz="3200" i="1" dirty="0"/>
+              <a:t>is </a:t>
+            </a:r>
+          </a:p>
+          <a:p>
+            <a:pPr algn="ctr"/>
+            <a:r>
+              <a:rPr lang="en-US" sz="3200" i="1" dirty="0"/>
+              <a:t>not taught in CSSE220</a:t>
+            </a:r>
+          </a:p>
+          <a:p>
+            <a:pPr algn="ctr"/>
+            <a:r>
+              <a:rPr lang="en-US" sz="3200" i="1" dirty="0"/>
+              <a:t>and you will </a:t>
+            </a:r>
+            <a:r>
+              <a:rPr lang="en-US" sz="3200" b="1" i="1" u="sng" dirty="0"/>
+              <a:t>not</a:t>
+            </a:r>
+            <a:r>
+              <a:rPr lang="en-US" sz="3200" i="1" dirty="0"/>
+              <a:t> receive credit for solutions produced using it</a:t>
+            </a:r>
+          </a:p>
+          <a:p>
+            <a:pPr algn="ctr"/>
+            <a:endParaRPr lang="en-US" sz="3200" b="1" dirty="0"/>
           </a:p>
         </p:txBody>
       </p:sp>

</xml_diff>

<commit_message>
updating various slides and fixing exception project setup for a single solution project
</commit_message>
<xml_diff>
--- a/ClassMaterials/IntroToGraphics/Slides/Graphics.pptx
+++ b/ClassMaterials/IntroToGraphics/Slides/Graphics.pptx
@@ -5248,7 +5248,7 @@
               <a:pPr>
                 <a:defRPr/>
               </a:pPr>
-              <a:t>Monday, December 12, 2022</a:t>
+              <a:t>Monday, February 26, 2024</a:t>
             </a:fld>
             <a:endParaRPr lang="en-US" dirty="0"/>
           </a:p>
@@ -10263,8 +10263,8 @@
         </p:nvSpPr>
         <p:spPr>
           <a:xfrm>
-            <a:off x="304620" y="5185401"/>
-            <a:ext cx="8534400" cy="1295400"/>
+            <a:off x="304620" y="4612341"/>
+            <a:ext cx="8534400" cy="1868460"/>
           </a:xfrm>
           <a:prstGeom prst="rect">
             <a:avLst/>
@@ -10340,6 +10340,27 @@
             </a:r>
             <a:endParaRPr lang="en-US" sz="2400" i="1" dirty="0"/>
           </a:p>
+          <a:p>
+            <a:r>
+              <a:rPr lang="en-US" sz="2400" dirty="0">
+                <a:solidFill>
+                  <a:srgbClr val="FFFFFF"/>
+                </a:solidFill>
+              </a:rPr>
+              <a:t>The Quiz for today is:</a:t>
+            </a:r>
+          </a:p>
+          <a:p>
+            <a:pPr marL="342900" indent="-342900">
+              <a:buFont typeface="Arial" panose="020B0604020202020204" pitchFamily="34" charset="0"/>
+              <a:buChar char="•"/>
+            </a:pPr>
+            <a:r>
+              <a:rPr lang="en-US" sz="2400" i="1" dirty="0" err="1"/>
+              <a:t>GraphicsQuiz</a:t>
+            </a:r>
+            <a:endParaRPr lang="en-US" sz="2400" i="1" dirty="0"/>
+          </a:p>
         </p:txBody>
       </p:sp>
       <p:sp>
@@ -10398,18 +10419,13 @@
           </a:p>
           <a:p>
             <a:r>
-              <a:rPr lang="en-US" sz="4400" dirty="0" err="1">
+              <a:rPr lang="en-US" sz="4400" dirty="0">
                 <a:highlight>
                   <a:srgbClr val="FFFF00"/>
                 </a:highlight>
               </a:rPr>
-              <a:t>howtodraw</a:t>
-            </a:r>
-            <a:endParaRPr lang="en-US" sz="4400" dirty="0">
-              <a:highlight>
-                <a:srgbClr val="FFFF00"/>
-              </a:highlight>
-            </a:endParaRPr>
+              <a:t>__________</a:t>
+            </a:r>
           </a:p>
         </p:txBody>
       </p:sp>
@@ -11502,6 +11518,13 @@
             </a:effectRef>
             <a:fontRef idx="minor"/>
           </p:style>
+          <p:txBody>
+            <a:bodyPr/>
+            <a:lstStyle/>
+            <a:p>
+              <a:endParaRPr lang="en-US"/>
+            </a:p>
+          </p:txBody>
         </p:sp>
         <p:sp>
           <p:nvSpPr>
@@ -11536,6 +11559,13 @@
             </a:effectRef>
             <a:fontRef idx="minor"/>
           </p:style>
+          <p:txBody>
+            <a:bodyPr/>
+            <a:lstStyle/>
+            <a:p>
+              <a:endParaRPr lang="en-US"/>
+            </a:p>
+          </p:txBody>
         </p:sp>
         <p:sp>
           <p:nvSpPr>
@@ -11570,6 +11600,13 @@
             </a:effectRef>
             <a:fontRef idx="minor"/>
           </p:style>
+          <p:txBody>
+            <a:bodyPr/>
+            <a:lstStyle/>
+            <a:p>
+              <a:endParaRPr lang="en-US"/>
+            </a:p>
+          </p:txBody>
         </p:sp>
         <p:sp>
           <p:nvSpPr>
@@ -11604,6 +11641,13 @@
             </a:effectRef>
             <a:fontRef idx="minor"/>
           </p:style>
+          <p:txBody>
+            <a:bodyPr/>
+            <a:lstStyle/>
+            <a:p>
+              <a:endParaRPr lang="en-US"/>
+            </a:p>
+          </p:txBody>
         </p:sp>
         <p:sp>
           <p:nvSpPr>
@@ -11637,6 +11681,13 @@
             </a:effectRef>
             <a:fontRef idx="minor"/>
           </p:style>
+          <p:txBody>
+            <a:bodyPr/>
+            <a:lstStyle/>
+            <a:p>
+              <a:endParaRPr lang="en-US"/>
+            </a:p>
+          </p:txBody>
         </p:sp>
         <p:sp>
           <p:nvSpPr>
@@ -11670,6 +11721,13 @@
             </a:effectRef>
             <a:fontRef idx="minor"/>
           </p:style>
+          <p:txBody>
+            <a:bodyPr/>
+            <a:lstStyle/>
+            <a:p>
+              <a:endParaRPr lang="en-US"/>
+            </a:p>
+          </p:txBody>
         </p:sp>
         <p:sp>
           <p:nvSpPr>
@@ -11703,6 +11761,13 @@
             </a:effectRef>
             <a:fontRef idx="minor"/>
           </p:style>
+          <p:txBody>
+            <a:bodyPr/>
+            <a:lstStyle/>
+            <a:p>
+              <a:endParaRPr lang="en-US"/>
+            </a:p>
+          </p:txBody>
         </p:sp>
         <p:sp>
           <p:nvSpPr>
@@ -12916,6 +12981,13 @@
             </a:effectRef>
             <a:fontRef idx="minor"/>
           </p:style>
+          <p:txBody>
+            <a:bodyPr/>
+            <a:lstStyle/>
+            <a:p>
+              <a:endParaRPr lang="en-US"/>
+            </a:p>
+          </p:txBody>
         </p:sp>
         <p:sp>
           <p:nvSpPr>
@@ -12950,6 +13022,13 @@
             </a:effectRef>
             <a:fontRef idx="minor"/>
           </p:style>
+          <p:txBody>
+            <a:bodyPr/>
+            <a:lstStyle/>
+            <a:p>
+              <a:endParaRPr lang="en-US"/>
+            </a:p>
+          </p:txBody>
         </p:sp>
         <p:sp>
           <p:nvSpPr>
@@ -12984,6 +13063,13 @@
             </a:effectRef>
             <a:fontRef idx="minor"/>
           </p:style>
+          <p:txBody>
+            <a:bodyPr/>
+            <a:lstStyle/>
+            <a:p>
+              <a:endParaRPr lang="en-US"/>
+            </a:p>
+          </p:txBody>
         </p:sp>
         <p:sp>
           <p:nvSpPr>
@@ -13018,6 +13104,13 @@
             </a:effectRef>
             <a:fontRef idx="minor"/>
           </p:style>
+          <p:txBody>
+            <a:bodyPr/>
+            <a:lstStyle/>
+            <a:p>
+              <a:endParaRPr lang="en-US"/>
+            </a:p>
+          </p:txBody>
         </p:sp>
         <p:sp>
           <p:nvSpPr>
@@ -13051,6 +13144,13 @@
             </a:effectRef>
             <a:fontRef idx="minor"/>
           </p:style>
+          <p:txBody>
+            <a:bodyPr/>
+            <a:lstStyle/>
+            <a:p>
+              <a:endParaRPr lang="en-US"/>
+            </a:p>
+          </p:txBody>
         </p:sp>
         <p:sp>
           <p:nvSpPr>
@@ -13084,6 +13184,13 @@
             </a:effectRef>
             <a:fontRef idx="minor"/>
           </p:style>
+          <p:txBody>
+            <a:bodyPr/>
+            <a:lstStyle/>
+            <a:p>
+              <a:endParaRPr lang="en-US"/>
+            </a:p>
+          </p:txBody>
         </p:sp>
         <p:sp>
           <p:nvSpPr>
@@ -13117,6 +13224,13 @@
             </a:effectRef>
             <a:fontRef idx="minor"/>
           </p:style>
+          <p:txBody>
+            <a:bodyPr/>
+            <a:lstStyle/>
+            <a:p>
+              <a:endParaRPr lang="en-US"/>
+            </a:p>
+          </p:txBody>
         </p:sp>
       </p:grpSp>
     </p:spTree>
@@ -15251,8 +15365,8 @@
           </a:prstGeom>
         </p:spPr>
       </p:pic>
-      <mc:AlternateContent xmlns:mc="http://schemas.openxmlformats.org/markup-compatibility/2006">
-        <mc:Choice xmlns:p14="http://schemas.microsoft.com/office/powerpoint/2010/main" Requires="p14">
+      <mc:AlternateContent xmlns:mc="http://schemas.openxmlformats.org/markup-compatibility/2006" xmlns:p14="http://schemas.microsoft.com/office/powerpoint/2010/main">
+        <mc:Choice Requires="p14">
           <p:contentPart p14:bwMode="auto" r:id="rId5">
             <p14:nvContentPartPr>
               <p14:cNvPr id="4" name="Ink 3">
@@ -15271,7 +15385,7 @@
             </p14:xfrm>
           </p:contentPart>
         </mc:Choice>
-        <mc:Fallback>
+        <mc:Fallback xmlns="">
           <p:pic>
             <p:nvPicPr>
               <p:cNvPr id="4" name="Ink 3">
@@ -15302,8 +15416,8 @@
           </p:pic>
         </mc:Fallback>
       </mc:AlternateContent>
-      <mc:AlternateContent xmlns:mc="http://schemas.openxmlformats.org/markup-compatibility/2006">
-        <mc:Choice xmlns:p14="http://schemas.microsoft.com/office/powerpoint/2010/main" Requires="p14">
+      <mc:AlternateContent xmlns:mc="http://schemas.openxmlformats.org/markup-compatibility/2006" xmlns:p14="http://schemas.microsoft.com/office/powerpoint/2010/main">
+        <mc:Choice Requires="p14">
           <p:contentPart p14:bwMode="auto" r:id="rId7">
             <p14:nvContentPartPr>
               <p14:cNvPr id="6" name="Ink 5">
@@ -15322,7 +15436,7 @@
             </p14:xfrm>
           </p:contentPart>
         </mc:Choice>
-        <mc:Fallback>
+        <mc:Fallback xmlns="">
           <p:pic>
             <p:nvPicPr>
               <p:cNvPr id="6" name="Ink 5">
@@ -19137,6 +19251,13 @@
           </a:effectRef>
           <a:fontRef idx="minor"/>
         </p:style>
+        <p:txBody>
+          <a:bodyPr/>
+          <a:lstStyle/>
+          <a:p>
+            <a:endParaRPr lang="en-US"/>
+          </a:p>
+        </p:txBody>
       </p:sp>
       <p:sp>
         <p:nvSpPr>
@@ -19171,6 +19292,13 @@
           </a:effectRef>
           <a:fontRef idx="minor"/>
         </p:style>
+        <p:txBody>
+          <a:bodyPr/>
+          <a:lstStyle/>
+          <a:p>
+            <a:endParaRPr lang="en-US"/>
+          </a:p>
+        </p:txBody>
       </p:sp>
       <p:sp>
         <p:nvSpPr>
@@ -19376,6 +19504,13 @@
           </a:effectRef>
           <a:fontRef idx="minor"/>
         </p:style>
+        <p:txBody>
+          <a:bodyPr/>
+          <a:lstStyle/>
+          <a:p>
+            <a:endParaRPr lang="en-US"/>
+          </a:p>
+        </p:txBody>
       </p:sp>
       <p:sp>
         <p:nvSpPr>
@@ -19410,6 +19545,13 @@
           </a:effectRef>
           <a:fontRef idx="minor"/>
         </p:style>
+        <p:txBody>
+          <a:bodyPr/>
+          <a:lstStyle/>
+          <a:p>
+            <a:endParaRPr lang="en-US"/>
+          </a:p>
+        </p:txBody>
       </p:sp>
       <p:sp>
         <p:nvSpPr>
@@ -19500,6 +19642,13 @@
           </a:effectRef>
           <a:fontRef idx="minor"/>
         </p:style>
+        <p:txBody>
+          <a:bodyPr/>
+          <a:lstStyle/>
+          <a:p>
+            <a:endParaRPr lang="en-US"/>
+          </a:p>
+        </p:txBody>
       </p:sp>
       <p:sp>
         <p:nvSpPr>
@@ -19674,6 +19823,13 @@
           </a:effectRef>
           <a:fontRef idx="minor"/>
         </p:style>
+        <p:txBody>
+          <a:bodyPr/>
+          <a:lstStyle/>
+          <a:p>
+            <a:endParaRPr lang="en-US"/>
+          </a:p>
+        </p:txBody>
       </p:sp>
       <p:sp>
         <p:nvSpPr>
@@ -19773,6 +19929,13 @@
           </a:effectRef>
           <a:fontRef idx="minor"/>
         </p:style>
+        <p:txBody>
+          <a:bodyPr/>
+          <a:lstStyle/>
+          <a:p>
+            <a:endParaRPr lang="en-US"/>
+          </a:p>
+        </p:txBody>
       </p:sp>
       <p:sp>
         <p:nvSpPr>

</xml_diff>